<commit_message>
Add documentation for stage 2 and playbook commands Fixes #18 Fixes #25
</commit_message>
<xml_diff>
--- a/misc/Figures.pptx
+++ b/misc/Figures.pptx
@@ -265,7 +265,7 @@
           <a:p>
             <a:fld id="{316A2214-5FFA-754C-901F-0917E1555ABA}" type="datetimeFigureOut">
               <a:rPr lang="en-US" smtClean="0"/>
-              <a:t>5/28/20</a:t>
+              <a:t>6/8/20</a:t>
             </a:fld>
             <a:endParaRPr lang="en-US"/>
           </a:p>
@@ -465,7 +465,7 @@
           <a:p>
             <a:fld id="{316A2214-5FFA-754C-901F-0917E1555ABA}" type="datetimeFigureOut">
               <a:rPr lang="en-US" smtClean="0"/>
-              <a:t>5/28/20</a:t>
+              <a:t>6/8/20</a:t>
             </a:fld>
             <a:endParaRPr lang="en-US"/>
           </a:p>
@@ -675,7 +675,7 @@
           <a:p>
             <a:fld id="{316A2214-5FFA-754C-901F-0917E1555ABA}" type="datetimeFigureOut">
               <a:rPr lang="en-US" smtClean="0"/>
-              <a:t>5/28/20</a:t>
+              <a:t>6/8/20</a:t>
             </a:fld>
             <a:endParaRPr lang="en-US"/>
           </a:p>
@@ -913,7 +913,7 @@
           <a:p>
             <a:fld id="{316A2214-5FFA-754C-901F-0917E1555ABA}" type="datetimeFigureOut">
               <a:rPr lang="en-US" smtClean="0"/>
-              <a:t>5/28/20</a:t>
+              <a:t>6/8/20</a:t>
             </a:fld>
             <a:endParaRPr lang="en-US"/>
           </a:p>
@@ -1189,7 +1189,7 @@
           <a:p>
             <a:fld id="{316A2214-5FFA-754C-901F-0917E1555ABA}" type="datetimeFigureOut">
               <a:rPr lang="en-US" smtClean="0"/>
-              <a:t>5/28/20</a:t>
+              <a:t>6/8/20</a:t>
             </a:fld>
             <a:endParaRPr lang="en-US"/>
           </a:p>
@@ -1457,7 +1457,7 @@
           <a:p>
             <a:fld id="{316A2214-5FFA-754C-901F-0917E1555ABA}" type="datetimeFigureOut">
               <a:rPr lang="en-US" smtClean="0"/>
-              <a:t>5/28/20</a:t>
+              <a:t>6/8/20</a:t>
             </a:fld>
             <a:endParaRPr lang="en-US"/>
           </a:p>
@@ -1872,7 +1872,7 @@
           <a:p>
             <a:fld id="{316A2214-5FFA-754C-901F-0917E1555ABA}" type="datetimeFigureOut">
               <a:rPr lang="en-US" smtClean="0"/>
-              <a:t>5/28/20</a:t>
+              <a:t>6/8/20</a:t>
             </a:fld>
             <a:endParaRPr lang="en-US"/>
           </a:p>
@@ -2014,7 +2014,7 @@
           <a:p>
             <a:fld id="{316A2214-5FFA-754C-901F-0917E1555ABA}" type="datetimeFigureOut">
               <a:rPr lang="en-US" smtClean="0"/>
-              <a:t>5/28/20</a:t>
+              <a:t>6/8/20</a:t>
             </a:fld>
             <a:endParaRPr lang="en-US"/>
           </a:p>
@@ -2127,7 +2127,7 @@
           <a:p>
             <a:fld id="{316A2214-5FFA-754C-901F-0917E1555ABA}" type="datetimeFigureOut">
               <a:rPr lang="en-US" smtClean="0"/>
-              <a:t>5/28/20</a:t>
+              <a:t>6/8/20</a:t>
             </a:fld>
             <a:endParaRPr lang="en-US"/>
           </a:p>
@@ -2440,7 +2440,7 @@
           <a:p>
             <a:fld id="{316A2214-5FFA-754C-901F-0917E1555ABA}" type="datetimeFigureOut">
               <a:rPr lang="en-US" smtClean="0"/>
-              <a:t>5/28/20</a:t>
+              <a:t>6/8/20</a:t>
             </a:fld>
             <a:endParaRPr lang="en-US"/>
           </a:p>
@@ -2729,7 +2729,7 @@
           <a:p>
             <a:fld id="{316A2214-5FFA-754C-901F-0917E1555ABA}" type="datetimeFigureOut">
               <a:rPr lang="en-US" smtClean="0"/>
-              <a:t>5/28/20</a:t>
+              <a:t>6/8/20</a:t>
             </a:fld>
             <a:endParaRPr lang="en-US"/>
           </a:p>
@@ -2972,7 +2972,7 @@
           <a:p>
             <a:fld id="{316A2214-5FFA-754C-901F-0917E1555ABA}" type="datetimeFigureOut">
               <a:rPr lang="en-US" smtClean="0"/>
-              <a:t>5/28/20</a:t>
+              <a:t>6/8/20</a:t>
             </a:fld>
             <a:endParaRPr lang="en-US"/>
           </a:p>
@@ -8929,14 +8929,14 @@
           </a:ln>
           <a:extLst>
             <a:ext uri="{909E8E84-426E-40dd-AFC4-6F175D3DCCD1}">
-              <a14:hiddenFill xmlns:a14="http://schemas.microsoft.com/office/drawing/2010/main" xmlns="">
+              <a14:hiddenFill xmlns="" xmlns:a14="http://schemas.microsoft.com/office/drawing/2010/main">
                 <a:solidFill>
                   <a:srgbClr val="FFFFFF"/>
                 </a:solidFill>
               </a14:hiddenFill>
             </a:ext>
             <a:ext uri="{91240B29-F687-4f45-9708-019B960494DF}">
-              <a14:hiddenLine xmlns:a14="http://schemas.microsoft.com/office/drawing/2010/main" xmlns="" w="12700">
+              <a14:hiddenLine xmlns="" xmlns:a14="http://schemas.microsoft.com/office/drawing/2010/main" w="12700">
                 <a:solidFill>
                   <a:schemeClr val="tx1"/>
                 </a:solidFill>
@@ -9811,14 +9811,14 @@
           </a:ln>
           <a:extLst>
             <a:ext uri="{909E8E84-426E-40dd-AFC4-6F175D3DCCD1}">
-              <a14:hiddenFill xmlns:a14="http://schemas.microsoft.com/office/drawing/2010/main" xmlns="">
+              <a14:hiddenFill xmlns="" xmlns:a14="http://schemas.microsoft.com/office/drawing/2010/main">
                 <a:solidFill>
                   <a:srgbClr val="FFFFFF"/>
                 </a:solidFill>
               </a14:hiddenFill>
             </a:ext>
             <a:ext uri="{91240B29-F687-4f45-9708-019B960494DF}">
-              <a14:hiddenLine xmlns:a14="http://schemas.microsoft.com/office/drawing/2010/main" xmlns="" w="12700">
+              <a14:hiddenLine xmlns="" xmlns:a14="http://schemas.microsoft.com/office/drawing/2010/main" w="12700">
                 <a:solidFill>
                   <a:schemeClr val="tx1"/>
                 </a:solidFill>
@@ -10693,14 +10693,14 @@
           </a:ln>
           <a:extLst>
             <a:ext uri="{909E8E84-426E-40dd-AFC4-6F175D3DCCD1}">
-              <a14:hiddenFill xmlns:a14="http://schemas.microsoft.com/office/drawing/2010/main" xmlns="">
+              <a14:hiddenFill xmlns="" xmlns:a14="http://schemas.microsoft.com/office/drawing/2010/main">
                 <a:solidFill>
                   <a:srgbClr val="FFFFFF"/>
                 </a:solidFill>
               </a14:hiddenFill>
             </a:ext>
             <a:ext uri="{91240B29-F687-4f45-9708-019B960494DF}">
-              <a14:hiddenLine xmlns:a14="http://schemas.microsoft.com/office/drawing/2010/main" xmlns="" w="12700">
+              <a14:hiddenLine xmlns="" xmlns:a14="http://schemas.microsoft.com/office/drawing/2010/main" w="12700">
                 <a:solidFill>
                   <a:schemeClr val="tx1"/>
                 </a:solidFill>
@@ -11575,14 +11575,14 @@
           </a:ln>
           <a:extLst>
             <a:ext uri="{909E8E84-426E-40dd-AFC4-6F175D3DCCD1}">
-              <a14:hiddenFill xmlns:a14="http://schemas.microsoft.com/office/drawing/2010/main" xmlns="">
+              <a14:hiddenFill xmlns="" xmlns:a14="http://schemas.microsoft.com/office/drawing/2010/main">
                 <a:solidFill>
                   <a:srgbClr val="FFFFFF"/>
                 </a:solidFill>
               </a14:hiddenFill>
             </a:ext>
             <a:ext uri="{91240B29-F687-4f45-9708-019B960494DF}">
-              <a14:hiddenLine xmlns:a14="http://schemas.microsoft.com/office/drawing/2010/main" xmlns="" w="12700">
+              <a14:hiddenLine xmlns="" xmlns:a14="http://schemas.microsoft.com/office/drawing/2010/main" w="12700">
                 <a:solidFill>
                   <a:schemeClr val="tx1"/>
                 </a:solidFill>
@@ -16446,14 +16446,14 @@
           </a:ln>
           <a:extLst>
             <a:ext uri="{909E8E84-426E-40dd-AFC4-6F175D3DCCD1}">
-              <a14:hiddenFill xmlns:a14="http://schemas.microsoft.com/office/drawing/2010/main" xmlns="">
+              <a14:hiddenFill xmlns="" xmlns:a14="http://schemas.microsoft.com/office/drawing/2010/main">
                 <a:solidFill>
                   <a:srgbClr val="FFFFFF"/>
                 </a:solidFill>
               </a14:hiddenFill>
             </a:ext>
             <a:ext uri="{91240B29-F687-4f45-9708-019B960494DF}">
-              <a14:hiddenLine xmlns:a14="http://schemas.microsoft.com/office/drawing/2010/main" xmlns="" w="12700">
+              <a14:hiddenLine xmlns="" xmlns:a14="http://schemas.microsoft.com/office/drawing/2010/main" w="12700">
                 <a:solidFill>
                   <a:schemeClr val="tx1"/>
                 </a:solidFill>
@@ -17328,14 +17328,14 @@
           </a:ln>
           <a:extLst>
             <a:ext uri="{909E8E84-426E-40dd-AFC4-6F175D3DCCD1}">
-              <a14:hiddenFill xmlns:a14="http://schemas.microsoft.com/office/drawing/2010/main" xmlns="">
+              <a14:hiddenFill xmlns="" xmlns:a14="http://schemas.microsoft.com/office/drawing/2010/main">
                 <a:solidFill>
                   <a:srgbClr val="FFFFFF"/>
                 </a:solidFill>
               </a14:hiddenFill>
             </a:ext>
             <a:ext uri="{91240B29-F687-4f45-9708-019B960494DF}">
-              <a14:hiddenLine xmlns:a14="http://schemas.microsoft.com/office/drawing/2010/main" xmlns="" w="12700">
+              <a14:hiddenLine xmlns="" xmlns:a14="http://schemas.microsoft.com/office/drawing/2010/main" w="12700">
                 <a:solidFill>
                   <a:schemeClr val="tx1"/>
                 </a:solidFill>
@@ -18210,14 +18210,14 @@
           </a:ln>
           <a:extLst>
             <a:ext uri="{909E8E84-426E-40dd-AFC4-6F175D3DCCD1}">
-              <a14:hiddenFill xmlns:a14="http://schemas.microsoft.com/office/drawing/2010/main" xmlns="">
+              <a14:hiddenFill xmlns="" xmlns:a14="http://schemas.microsoft.com/office/drawing/2010/main">
                 <a:solidFill>
                   <a:srgbClr val="FFFFFF"/>
                 </a:solidFill>
               </a14:hiddenFill>
             </a:ext>
             <a:ext uri="{91240B29-F687-4f45-9708-019B960494DF}">
-              <a14:hiddenLine xmlns:a14="http://schemas.microsoft.com/office/drawing/2010/main" xmlns="" w="12700">
+              <a14:hiddenLine xmlns="" xmlns:a14="http://schemas.microsoft.com/office/drawing/2010/main" w="12700">
                 <a:solidFill>
                   <a:schemeClr val="tx1"/>
                 </a:solidFill>
@@ -19092,14 +19092,14 @@
           </a:ln>
           <a:extLst>
             <a:ext uri="{909E8E84-426E-40dd-AFC4-6F175D3DCCD1}">
-              <a14:hiddenFill xmlns:a14="http://schemas.microsoft.com/office/drawing/2010/main" xmlns="">
+              <a14:hiddenFill xmlns="" xmlns:a14="http://schemas.microsoft.com/office/drawing/2010/main">
                 <a:solidFill>
                   <a:srgbClr val="FFFFFF"/>
                 </a:solidFill>
               </a14:hiddenFill>
             </a:ext>
             <a:ext uri="{91240B29-F687-4f45-9708-019B960494DF}">
-              <a14:hiddenLine xmlns:a14="http://schemas.microsoft.com/office/drawing/2010/main" xmlns="" w="12700">
+              <a14:hiddenLine xmlns="" xmlns:a14="http://schemas.microsoft.com/office/drawing/2010/main" w="12700">
                 <a:solidFill>
                   <a:schemeClr val="tx1"/>
                 </a:solidFill>
@@ -20262,14 +20262,14 @@
           </a:ln>
           <a:extLst>
             <a:ext uri="{909E8E84-426E-40dd-AFC4-6F175D3DCCD1}">
-              <a14:hiddenFill xmlns:a14="http://schemas.microsoft.com/office/drawing/2010/main" xmlns="">
+              <a14:hiddenFill xmlns="" xmlns:a14="http://schemas.microsoft.com/office/drawing/2010/main">
                 <a:solidFill>
                   <a:srgbClr val="FFFFFF"/>
                 </a:solidFill>
               </a14:hiddenFill>
             </a:ext>
             <a:ext uri="{91240B29-F687-4f45-9708-019B960494DF}">
-              <a14:hiddenLine xmlns:a14="http://schemas.microsoft.com/office/drawing/2010/main" xmlns="" w="12700">
+              <a14:hiddenLine xmlns="" xmlns:a14="http://schemas.microsoft.com/office/drawing/2010/main" w="12700">
                 <a:solidFill>
                   <a:schemeClr val="tx1"/>
                 </a:solidFill>

</xml_diff>

<commit_message>
Add sequence diagram for stage 3
</commit_message>
<xml_diff>
--- a/misc/Figures.pptx
+++ b/misc/Figures.pptx
@@ -269,7 +269,7 @@
           <a:p>
             <a:fld id="{316A2214-5FFA-754C-901F-0917E1555ABA}" type="datetimeFigureOut">
               <a:rPr lang="en-US" smtClean="0"/>
-              <a:t>6/10/20</a:t>
+              <a:t>6/12/20</a:t>
             </a:fld>
             <a:endParaRPr lang="en-US"/>
           </a:p>
@@ -469,7 +469,7 @@
           <a:p>
             <a:fld id="{316A2214-5FFA-754C-901F-0917E1555ABA}" type="datetimeFigureOut">
               <a:rPr lang="en-US" smtClean="0"/>
-              <a:t>6/10/20</a:t>
+              <a:t>6/12/20</a:t>
             </a:fld>
             <a:endParaRPr lang="en-US"/>
           </a:p>
@@ -679,7 +679,7 @@
           <a:p>
             <a:fld id="{316A2214-5FFA-754C-901F-0917E1555ABA}" type="datetimeFigureOut">
               <a:rPr lang="en-US" smtClean="0"/>
-              <a:t>6/10/20</a:t>
+              <a:t>6/12/20</a:t>
             </a:fld>
             <a:endParaRPr lang="en-US"/>
           </a:p>
@@ -917,7 +917,7 @@
           <a:p>
             <a:fld id="{316A2214-5FFA-754C-901F-0917E1555ABA}" type="datetimeFigureOut">
               <a:rPr lang="en-US" smtClean="0"/>
-              <a:t>6/10/20</a:t>
+              <a:t>6/12/20</a:t>
             </a:fld>
             <a:endParaRPr lang="en-US"/>
           </a:p>
@@ -1193,7 +1193,7 @@
           <a:p>
             <a:fld id="{316A2214-5FFA-754C-901F-0917E1555ABA}" type="datetimeFigureOut">
               <a:rPr lang="en-US" smtClean="0"/>
-              <a:t>6/10/20</a:t>
+              <a:t>6/12/20</a:t>
             </a:fld>
             <a:endParaRPr lang="en-US"/>
           </a:p>
@@ -1461,7 +1461,7 @@
           <a:p>
             <a:fld id="{316A2214-5FFA-754C-901F-0917E1555ABA}" type="datetimeFigureOut">
               <a:rPr lang="en-US" smtClean="0"/>
-              <a:t>6/10/20</a:t>
+              <a:t>6/12/20</a:t>
             </a:fld>
             <a:endParaRPr lang="en-US"/>
           </a:p>
@@ -1876,7 +1876,7 @@
           <a:p>
             <a:fld id="{316A2214-5FFA-754C-901F-0917E1555ABA}" type="datetimeFigureOut">
               <a:rPr lang="en-US" smtClean="0"/>
-              <a:t>6/10/20</a:t>
+              <a:t>6/12/20</a:t>
             </a:fld>
             <a:endParaRPr lang="en-US"/>
           </a:p>
@@ -2018,7 +2018,7 @@
           <a:p>
             <a:fld id="{316A2214-5FFA-754C-901F-0917E1555ABA}" type="datetimeFigureOut">
               <a:rPr lang="en-US" smtClean="0"/>
-              <a:t>6/10/20</a:t>
+              <a:t>6/12/20</a:t>
             </a:fld>
             <a:endParaRPr lang="en-US"/>
           </a:p>
@@ -2131,7 +2131,7 @@
           <a:p>
             <a:fld id="{316A2214-5FFA-754C-901F-0917E1555ABA}" type="datetimeFigureOut">
               <a:rPr lang="en-US" smtClean="0"/>
-              <a:t>6/10/20</a:t>
+              <a:t>6/12/20</a:t>
             </a:fld>
             <a:endParaRPr lang="en-US"/>
           </a:p>
@@ -2444,7 +2444,7 @@
           <a:p>
             <a:fld id="{316A2214-5FFA-754C-901F-0917E1555ABA}" type="datetimeFigureOut">
               <a:rPr lang="en-US" smtClean="0"/>
-              <a:t>6/10/20</a:t>
+              <a:t>6/12/20</a:t>
             </a:fld>
             <a:endParaRPr lang="en-US"/>
           </a:p>
@@ -2733,7 +2733,7 @@
           <a:p>
             <a:fld id="{316A2214-5FFA-754C-901F-0917E1555ABA}" type="datetimeFigureOut">
               <a:rPr lang="en-US" smtClean="0"/>
-              <a:t>6/10/20</a:t>
+              <a:t>6/12/20</a:t>
             </a:fld>
             <a:endParaRPr lang="en-US"/>
           </a:p>
@@ -2976,7 +2976,7 @@
           <a:p>
             <a:fld id="{316A2214-5FFA-754C-901F-0917E1555ABA}" type="datetimeFigureOut">
               <a:rPr lang="en-US" smtClean="0"/>
-              <a:t>6/10/20</a:t>
+              <a:t>6/12/20</a:t>
             </a:fld>
             <a:endParaRPr lang="en-US"/>
           </a:p>
@@ -8933,14 +8933,14 @@
           </a:ln>
           <a:extLst>
             <a:ext uri="{909E8E84-426E-40dd-AFC4-6F175D3DCCD1}">
-              <a14:hiddenFill xmlns:a14="http://schemas.microsoft.com/office/drawing/2010/main" xmlns="">
+              <a14:hiddenFill xmlns="" xmlns:a14="http://schemas.microsoft.com/office/drawing/2010/main">
                 <a:solidFill>
                   <a:srgbClr val="FFFFFF"/>
                 </a:solidFill>
               </a14:hiddenFill>
             </a:ext>
             <a:ext uri="{91240B29-F687-4f45-9708-019B960494DF}">
-              <a14:hiddenLine xmlns:a14="http://schemas.microsoft.com/office/drawing/2010/main" xmlns="" w="12700">
+              <a14:hiddenLine xmlns="" xmlns:a14="http://schemas.microsoft.com/office/drawing/2010/main" w="12700">
                 <a:solidFill>
                   <a:schemeClr val="tx1"/>
                 </a:solidFill>
@@ -9815,14 +9815,14 @@
           </a:ln>
           <a:extLst>
             <a:ext uri="{909E8E84-426E-40dd-AFC4-6F175D3DCCD1}">
-              <a14:hiddenFill xmlns:a14="http://schemas.microsoft.com/office/drawing/2010/main" xmlns="">
+              <a14:hiddenFill xmlns="" xmlns:a14="http://schemas.microsoft.com/office/drawing/2010/main">
                 <a:solidFill>
                   <a:srgbClr val="FFFFFF"/>
                 </a:solidFill>
               </a14:hiddenFill>
             </a:ext>
             <a:ext uri="{91240B29-F687-4f45-9708-019B960494DF}">
-              <a14:hiddenLine xmlns:a14="http://schemas.microsoft.com/office/drawing/2010/main" xmlns="" w="12700">
+              <a14:hiddenLine xmlns="" xmlns:a14="http://schemas.microsoft.com/office/drawing/2010/main" w="12700">
                 <a:solidFill>
                   <a:schemeClr val="tx1"/>
                 </a:solidFill>
@@ -10697,14 +10697,14 @@
           </a:ln>
           <a:extLst>
             <a:ext uri="{909E8E84-426E-40dd-AFC4-6F175D3DCCD1}">
-              <a14:hiddenFill xmlns:a14="http://schemas.microsoft.com/office/drawing/2010/main" xmlns="">
+              <a14:hiddenFill xmlns="" xmlns:a14="http://schemas.microsoft.com/office/drawing/2010/main">
                 <a:solidFill>
                   <a:srgbClr val="FFFFFF"/>
                 </a:solidFill>
               </a14:hiddenFill>
             </a:ext>
             <a:ext uri="{91240B29-F687-4f45-9708-019B960494DF}">
-              <a14:hiddenLine xmlns:a14="http://schemas.microsoft.com/office/drawing/2010/main" xmlns="" w="12700">
+              <a14:hiddenLine xmlns="" xmlns:a14="http://schemas.microsoft.com/office/drawing/2010/main" w="12700">
                 <a:solidFill>
                   <a:schemeClr val="tx1"/>
                 </a:solidFill>
@@ -11579,14 +11579,14 @@
           </a:ln>
           <a:extLst>
             <a:ext uri="{909E8E84-426E-40dd-AFC4-6F175D3DCCD1}">
-              <a14:hiddenFill xmlns:a14="http://schemas.microsoft.com/office/drawing/2010/main" xmlns="">
+              <a14:hiddenFill xmlns="" xmlns:a14="http://schemas.microsoft.com/office/drawing/2010/main">
                 <a:solidFill>
                   <a:srgbClr val="FFFFFF"/>
                 </a:solidFill>
               </a14:hiddenFill>
             </a:ext>
             <a:ext uri="{91240B29-F687-4f45-9708-019B960494DF}">
-              <a14:hiddenLine xmlns:a14="http://schemas.microsoft.com/office/drawing/2010/main" xmlns="" w="12700">
+              <a14:hiddenLine xmlns="" xmlns:a14="http://schemas.microsoft.com/office/drawing/2010/main" w="12700">
                 <a:solidFill>
                   <a:schemeClr val="tx1"/>
                 </a:solidFill>
@@ -16450,14 +16450,14 @@
           </a:ln>
           <a:extLst>
             <a:ext uri="{909E8E84-426E-40dd-AFC4-6F175D3DCCD1}">
-              <a14:hiddenFill xmlns:a14="http://schemas.microsoft.com/office/drawing/2010/main" xmlns="">
+              <a14:hiddenFill xmlns="" xmlns:a14="http://schemas.microsoft.com/office/drawing/2010/main">
                 <a:solidFill>
                   <a:srgbClr val="FFFFFF"/>
                 </a:solidFill>
               </a14:hiddenFill>
             </a:ext>
             <a:ext uri="{91240B29-F687-4f45-9708-019B960494DF}">
-              <a14:hiddenLine xmlns:a14="http://schemas.microsoft.com/office/drawing/2010/main" xmlns="" w="12700">
+              <a14:hiddenLine xmlns="" xmlns:a14="http://schemas.microsoft.com/office/drawing/2010/main" w="12700">
                 <a:solidFill>
                   <a:schemeClr val="tx1"/>
                 </a:solidFill>
@@ -17332,14 +17332,14 @@
           </a:ln>
           <a:extLst>
             <a:ext uri="{909E8E84-426E-40dd-AFC4-6F175D3DCCD1}">
-              <a14:hiddenFill xmlns:a14="http://schemas.microsoft.com/office/drawing/2010/main" xmlns="">
+              <a14:hiddenFill xmlns="" xmlns:a14="http://schemas.microsoft.com/office/drawing/2010/main">
                 <a:solidFill>
                   <a:srgbClr val="FFFFFF"/>
                 </a:solidFill>
               </a14:hiddenFill>
             </a:ext>
             <a:ext uri="{91240B29-F687-4f45-9708-019B960494DF}">
-              <a14:hiddenLine xmlns:a14="http://schemas.microsoft.com/office/drawing/2010/main" xmlns="" w="12700">
+              <a14:hiddenLine xmlns="" xmlns:a14="http://schemas.microsoft.com/office/drawing/2010/main" w="12700">
                 <a:solidFill>
                   <a:schemeClr val="tx1"/>
                 </a:solidFill>
@@ -18214,14 +18214,14 @@
           </a:ln>
           <a:extLst>
             <a:ext uri="{909E8E84-426E-40dd-AFC4-6F175D3DCCD1}">
-              <a14:hiddenFill xmlns:a14="http://schemas.microsoft.com/office/drawing/2010/main" xmlns="">
+              <a14:hiddenFill xmlns="" xmlns:a14="http://schemas.microsoft.com/office/drawing/2010/main">
                 <a:solidFill>
                   <a:srgbClr val="FFFFFF"/>
                 </a:solidFill>
               </a14:hiddenFill>
             </a:ext>
             <a:ext uri="{91240B29-F687-4f45-9708-019B960494DF}">
-              <a14:hiddenLine xmlns:a14="http://schemas.microsoft.com/office/drawing/2010/main" xmlns="" w="12700">
+              <a14:hiddenLine xmlns="" xmlns:a14="http://schemas.microsoft.com/office/drawing/2010/main" w="12700">
                 <a:solidFill>
                   <a:schemeClr val="tx1"/>
                 </a:solidFill>
@@ -19096,14 +19096,14 @@
           </a:ln>
           <a:extLst>
             <a:ext uri="{909E8E84-426E-40dd-AFC4-6F175D3DCCD1}">
-              <a14:hiddenFill xmlns:a14="http://schemas.microsoft.com/office/drawing/2010/main" xmlns="">
+              <a14:hiddenFill xmlns="" xmlns:a14="http://schemas.microsoft.com/office/drawing/2010/main">
                 <a:solidFill>
                   <a:srgbClr val="FFFFFF"/>
                 </a:solidFill>
               </a14:hiddenFill>
             </a:ext>
             <a:ext uri="{91240B29-F687-4f45-9708-019B960494DF}">
-              <a14:hiddenLine xmlns:a14="http://schemas.microsoft.com/office/drawing/2010/main" xmlns="" w="12700">
+              <a14:hiddenLine xmlns="" xmlns:a14="http://schemas.microsoft.com/office/drawing/2010/main" w="12700">
                 <a:solidFill>
                   <a:schemeClr val="tx1"/>
                 </a:solidFill>
@@ -19159,7 +19159,7 @@
 </file>
 
 <file path=ppt/slides/slide5.xml><?xml version="1.0" encoding="utf-8"?>
-<p:sld xmlns:a="http://schemas.openxmlformats.org/drawingml/2006/main" xmlns:r="http://schemas.openxmlformats.org/officeDocument/2006/relationships" xmlns:p="http://schemas.openxmlformats.org/presentationml/2006/main">
+<p:sld xmlns:a="http://schemas.openxmlformats.org/drawingml/2006/main" xmlns:r="http://schemas.openxmlformats.org/officeDocument/2006/relationships" xmlns:p="http://schemas.openxmlformats.org/presentationml/2006/main" show="0">
   <p:cSld>
     <p:spTree>
       <p:nvGrpSpPr>
@@ -20088,7 +20088,7 @@
         <p:spPr>
           <a:xfrm>
             <a:off x="2582053" y="2449711"/>
-            <a:ext cx="2711356" cy="556084"/>
+            <a:ext cx="2711356" cy="786916"/>
           </a:xfrm>
           <a:prstGeom prst="rect">
             <a:avLst/>
@@ -20281,7 +20281,7 @@
                 <a:ea typeface="Lato Light" charset="0"/>
                 <a:cs typeface="Lato Light" charset="0"/>
               </a:rPr>
-              <a:t>Notify Node Agents about upcoming infrastructure updates  </a:t>
+              <a:t>Notify Node Agents and applications about upcoming infrastructure updates  </a:t>
             </a:r>
           </a:p>
         </p:txBody>
@@ -20314,14 +20314,14 @@
           </a:ln>
           <a:extLst>
             <a:ext uri="{909E8E84-426E-40dd-AFC4-6F175D3DCCD1}">
-              <a14:hiddenFill xmlns:a14="http://schemas.microsoft.com/office/drawing/2010/main" xmlns="">
+              <a14:hiddenFill xmlns="" xmlns:a14="http://schemas.microsoft.com/office/drawing/2010/main">
                 <a:solidFill>
                   <a:srgbClr val="FFFFFF"/>
                 </a:solidFill>
               </a14:hiddenFill>
             </a:ext>
             <a:ext uri="{91240B29-F687-4f45-9708-019B960494DF}">
-              <a14:hiddenLine xmlns:a14="http://schemas.microsoft.com/office/drawing/2010/main" xmlns="" w="12700">
+              <a14:hiddenLine xmlns="" xmlns:a14="http://schemas.microsoft.com/office/drawing/2010/main" w="12700">
                 <a:solidFill>
                   <a:schemeClr val="tx1"/>
                 </a:solidFill>
@@ -21163,7 +21163,7 @@
                 <a:ea typeface="Lato Light" charset="0"/>
                 <a:cs typeface="Lato Light" charset="0"/>
               </a:rPr>
-              <a:t>Let Node Agents apply the scheduled changes at pre-determined times and collect real-time reports</a:t>
+              <a:t>Let Node Agents and application apply the scheduled changes at pre-determined times and collect reports</a:t>
             </a:r>
           </a:p>
         </p:txBody>
@@ -21196,14 +21196,14 @@
           </a:ln>
           <a:extLst>
             <a:ext uri="{909E8E84-426E-40dd-AFC4-6F175D3DCCD1}">
-              <a14:hiddenFill xmlns:a14="http://schemas.microsoft.com/office/drawing/2010/main" xmlns="">
+              <a14:hiddenFill xmlns="" xmlns:a14="http://schemas.microsoft.com/office/drawing/2010/main">
                 <a:solidFill>
                   <a:srgbClr val="FFFFFF"/>
                 </a:solidFill>
               </a14:hiddenFill>
             </a:ext>
             <a:ext uri="{91240B29-F687-4f45-9708-019B960494DF}">
-              <a14:hiddenLine xmlns:a14="http://schemas.microsoft.com/office/drawing/2010/main" xmlns="" w="12700">
+              <a14:hiddenLine xmlns="" xmlns:a14="http://schemas.microsoft.com/office/drawing/2010/main" w="12700">
                 <a:solidFill>
                   <a:schemeClr val="tx1"/>
                 </a:solidFill>
@@ -21247,11 +21247,11 @@
   <p:clrMapOvr>
     <a:masterClrMapping/>
   </p:clrMapOvr>
-  <mc:AlternateContent xmlns:mc="http://schemas.openxmlformats.org/markup-compatibility/2006" xmlns:p14="http://schemas.microsoft.com/office/powerpoint/2010/main">
-    <mc:Choice Requires="p14">
+  <mc:AlternateContent xmlns:mc="http://schemas.openxmlformats.org/markup-compatibility/2006">
+    <mc:Choice xmlns:p14="http://schemas.microsoft.com/office/powerpoint/2010/main" Requires="p14">
       <p:transition p14:dur="0" advClick="0"/>
     </mc:Choice>
-    <mc:Fallback xmlns="">
+    <mc:Fallback>
       <p:transition advClick="0"/>
     </mc:Fallback>
   </mc:AlternateContent>
@@ -22919,11 +22919,11 @@
   <p:clrMapOvr>
     <a:masterClrMapping/>
   </p:clrMapOvr>
-  <mc:AlternateContent xmlns:mc="http://schemas.openxmlformats.org/markup-compatibility/2006">
-    <mc:Choice xmlns:p14="http://schemas.microsoft.com/office/powerpoint/2010/main" Requires="p14">
+  <mc:AlternateContent xmlns:mc="http://schemas.openxmlformats.org/markup-compatibility/2006" xmlns:p14="http://schemas.microsoft.com/office/powerpoint/2010/main">
+    <mc:Choice Requires="p14">
       <p:transition p14:dur="0" advClick="0"/>
     </mc:Choice>
-    <mc:Fallback>
+    <mc:Fallback xmlns="">
       <p:transition advClick="0"/>
     </mc:Fallback>
   </mc:AlternateContent>
@@ -24331,11 +24331,11 @@
   <p:clrMapOvr>
     <a:masterClrMapping/>
   </p:clrMapOvr>
-  <mc:AlternateContent xmlns:mc="http://schemas.openxmlformats.org/markup-compatibility/2006">
-    <mc:Choice xmlns:p14="http://schemas.microsoft.com/office/powerpoint/2010/main" Requires="p14">
+  <mc:AlternateContent xmlns:mc="http://schemas.openxmlformats.org/markup-compatibility/2006" xmlns:p14="http://schemas.microsoft.com/office/powerpoint/2010/main">
+    <mc:Choice Requires="p14">
       <p:transition p14:dur="0" advClick="0"/>
     </mc:Choice>
-    <mc:Fallback>
+    <mc:Fallback xmlns="">
       <p:transition advClick="0"/>
     </mc:Fallback>
   </mc:AlternateContent>
@@ -28579,11 +28579,11 @@
   <p:clrMapOvr>
     <a:masterClrMapping/>
   </p:clrMapOvr>
-  <mc:AlternateContent xmlns:mc="http://schemas.openxmlformats.org/markup-compatibility/2006">
-    <mc:Choice xmlns:p14="http://schemas.microsoft.com/office/powerpoint/2010/main" Requires="p14">
+  <mc:AlternateContent xmlns:mc="http://schemas.openxmlformats.org/markup-compatibility/2006" xmlns:p14="http://schemas.microsoft.com/office/powerpoint/2010/main">
+    <mc:Choice Requires="p14">
       <p:transition p14:dur="0" advClick="0"/>
     </mc:Choice>
-    <mc:Fallback>
+    <mc:Fallback xmlns="">
       <p:transition advClick="0"/>
     </mc:Fallback>
   </mc:AlternateContent>

</xml_diff>